<commit_message>
updated ppt and add pdf
</commit_message>
<xml_diff>
--- a/How to extract custom attributes from ACC.pptx
+++ b/How to extract custom attributes from ACC.pptx
@@ -1623,13 +1623,13 @@
         </p:spPr>
         <p:txBody>
           <a:bodyPr>
-            <a:normAutofit/>
+            <a:normAutofit fontScale="90000"/>
           </a:bodyPr>
           <a:lstStyle/>
           <a:p>
             <a:r>
               <a:rPr lang="en-GB" sz="3600" b="1" dirty="0"/>
-              <a:t>How to extract custom attributes from ACC/BIM360</a:t>
+              <a:t>How to extract custom attributes from ACC/BIM360 Docs</a:t>
             </a:r>
           </a:p>
         </p:txBody>
@@ -4244,6 +4244,15 @@
 </file>
 
 <file path=customXml/item1.xml><?xml version="1.0" encoding="utf-8"?>
+<?mso-contentType ?>
+<FormTemplates xmlns="http://schemas.microsoft.com/sharepoint/v3/contenttype/forms">
+  <Display>DocumentLibraryForm</Display>
+  <Edit>DocumentLibraryForm</Edit>
+  <New>DocumentLibraryForm</New>
+</FormTemplates>
+</file>
+
+<file path=customXml/item2.xml><?xml version="1.0" encoding="utf-8"?>
 <p:properties xmlns:p="http://schemas.microsoft.com/office/2006/metadata/properties" xmlns:xsi="http://www.w3.org/2001/XMLSchema-instance" xmlns:pc="http://schemas.microsoft.com/office/infopath/2007/PartnerControls">
   <documentManagement>
     <SharedWithUsers xmlns="92f2ef75-f633-4031-974a-4dfe5f63fa83">
@@ -4269,15 +4278,6 @@
     </lcf76f155ced4ddcb4097134ff3c332f>
   </documentManagement>
 </p:properties>
-</file>
-
-<file path=customXml/item2.xml><?xml version="1.0" encoding="utf-8"?>
-<?mso-contentType ?>
-<FormTemplates xmlns="http://schemas.microsoft.com/sharepoint/v3/contenttype/forms">
-  <Display>DocumentLibraryForm</Display>
-  <Edit>DocumentLibraryForm</Edit>
-  <New>DocumentLibraryForm</New>
-</FormTemplates>
 </file>
 
 <file path=customXml/item3.xml><?xml version="1.0" encoding="utf-8"?>
@@ -4522,28 +4522,26 @@
 </file>
 
 <file path=customXml/itemProps1.xml><?xml version="1.0" encoding="utf-8"?>
-<ds:datastoreItem xmlns:ds="http://schemas.openxmlformats.org/officeDocument/2006/customXml" ds:itemID="{DBE5AABA-8F90-4A1D-9746-64588D4E2128}">
+<ds:datastoreItem xmlns:ds="http://schemas.openxmlformats.org/officeDocument/2006/customXml" ds:itemID="{432F74CB-4A4A-4331-9D82-BE8AD9F16CFC}">
   <ds:schemaRefs>
-    <ds:schemaRef ds:uri="d2a58e1c-7c00-4aca-a78f-c3c8f7576a96"/>
-    <ds:schemaRef ds:uri="http://purl.org/dc/terms/"/>
-    <ds:schemaRef ds:uri="http://schemas.openxmlformats.org/package/2006/metadata/core-properties"/>
-    <ds:schemaRef ds:uri="http://schemas.microsoft.com/office/2006/documentManagement/types"/>
-    <ds:schemaRef ds:uri="http://schemas.microsoft.com/office/2006/metadata/properties"/>
-    <ds:schemaRef ds:uri="http://purl.org/dc/elements/1.1/"/>
-    <ds:schemaRef ds:uri="http://schemas.microsoft.com/office/infopath/2007/PartnerControls"/>
-    <ds:schemaRef ds:uri="949bbab6-a612-4cb6-8faa-2e3ec50c554f"/>
-    <ds:schemaRef ds:uri="http://www.w3.org/XML/1998/namespace"/>
-    <ds:schemaRef ds:uri="http://purl.org/dc/dcmitype/"/>
-    <ds:schemaRef ds:uri="92f2ef75-f633-4031-974a-4dfe5f63fa83"/>
-    <ds:schemaRef ds:uri="badd9579-e3c7-4ed4-a6ab-003bc2561046"/>
+    <ds:schemaRef ds:uri="http://schemas.microsoft.com/sharepoint/v3/contenttype/forms"/>
   </ds:schemaRefs>
 </ds:datastoreItem>
 </file>
 
 <file path=customXml/itemProps2.xml><?xml version="1.0" encoding="utf-8"?>
-<ds:datastoreItem xmlns:ds="http://schemas.openxmlformats.org/officeDocument/2006/customXml" ds:itemID="{432F74CB-4A4A-4331-9D82-BE8AD9F16CFC}">
+<ds:datastoreItem xmlns:ds="http://schemas.openxmlformats.org/officeDocument/2006/customXml" ds:itemID="{DBE5AABA-8F90-4A1D-9746-64588D4E2128}">
   <ds:schemaRefs>
-    <ds:schemaRef ds:uri="http://schemas.microsoft.com/sharepoint/v3/contenttype/forms"/>
+    <ds:schemaRef ds:uri="http://schemas.microsoft.com/office/2006/documentManagement/types"/>
+    <ds:schemaRef ds:uri="92f2ef75-f633-4031-974a-4dfe5f63fa83"/>
+    <ds:schemaRef ds:uri="http://purl.org/dc/elements/1.1/"/>
+    <ds:schemaRef ds:uri="http://schemas.microsoft.com/office/2006/metadata/properties"/>
+    <ds:schemaRef ds:uri="http://schemas.microsoft.com/office/infopath/2007/PartnerControls"/>
+    <ds:schemaRef ds:uri="badd9579-e3c7-4ed4-a6ab-003bc2561046"/>
+    <ds:schemaRef ds:uri="http://purl.org/dc/terms/"/>
+    <ds:schemaRef ds:uri="http://schemas.openxmlformats.org/package/2006/metadata/core-properties"/>
+    <ds:schemaRef ds:uri="http://www.w3.org/XML/1998/namespace"/>
+    <ds:schemaRef ds:uri="http://purl.org/dc/dcmitype/"/>
   </ds:schemaRefs>
 </ds:datastoreItem>
 </file>

</xml_diff>